<commit_message>
pseudo_resnet18 train and eval
</commit_message>
<xml_diff>
--- a/Network_framwork_v1.0.pptx
+++ b/Network_framwork_v1.0.pptx
@@ -6,6 +6,7 @@
   </p:sldMasterIdLst>
   <p:sldIdLst>
     <p:sldId id="257" r:id="rId2"/>
+    <p:sldId id="258" r:id="rId3"/>
   </p:sldIdLst>
   <p:sldSz cx="12192000" cy="6858000"/>
   <p:notesSz cx="6858000" cy="9144000"/>
@@ -259,7 +260,7 @@
           <a:p>
             <a:fld id="{C4DC939B-3778-4627-B2FC-DFBA9DECBC45}" type="datetimeFigureOut">
               <a:rPr lang="zh-CN" altLang="en-US" smtClean="0"/>
-              <a:t>2023/11/17</a:t>
+              <a:t>2023/11/22</a:t>
             </a:fld>
             <a:endParaRPr lang="zh-CN" altLang="en-US"/>
           </a:p>
@@ -457,7 +458,7 @@
           <a:p>
             <a:fld id="{C4DC939B-3778-4627-B2FC-DFBA9DECBC45}" type="datetimeFigureOut">
               <a:rPr lang="zh-CN" altLang="en-US" smtClean="0"/>
-              <a:t>2023/11/17</a:t>
+              <a:t>2023/11/22</a:t>
             </a:fld>
             <a:endParaRPr lang="zh-CN" altLang="en-US"/>
           </a:p>
@@ -665,7 +666,7 @@
           <a:p>
             <a:fld id="{C4DC939B-3778-4627-B2FC-DFBA9DECBC45}" type="datetimeFigureOut">
               <a:rPr lang="zh-CN" altLang="en-US" smtClean="0"/>
-              <a:t>2023/11/17</a:t>
+              <a:t>2023/11/22</a:t>
             </a:fld>
             <a:endParaRPr lang="zh-CN" altLang="en-US"/>
           </a:p>
@@ -863,7 +864,7 @@
           <a:p>
             <a:fld id="{C4DC939B-3778-4627-B2FC-DFBA9DECBC45}" type="datetimeFigureOut">
               <a:rPr lang="zh-CN" altLang="en-US" smtClean="0"/>
-              <a:t>2023/11/17</a:t>
+              <a:t>2023/11/22</a:t>
             </a:fld>
             <a:endParaRPr lang="zh-CN" altLang="en-US"/>
           </a:p>
@@ -1138,7 +1139,7 @@
           <a:p>
             <a:fld id="{C4DC939B-3778-4627-B2FC-DFBA9DECBC45}" type="datetimeFigureOut">
               <a:rPr lang="zh-CN" altLang="en-US" smtClean="0"/>
-              <a:t>2023/11/17</a:t>
+              <a:t>2023/11/22</a:t>
             </a:fld>
             <a:endParaRPr lang="zh-CN" altLang="en-US"/>
           </a:p>
@@ -1403,7 +1404,7 @@
           <a:p>
             <a:fld id="{C4DC939B-3778-4627-B2FC-DFBA9DECBC45}" type="datetimeFigureOut">
               <a:rPr lang="zh-CN" altLang="en-US" smtClean="0"/>
-              <a:t>2023/11/17</a:t>
+              <a:t>2023/11/22</a:t>
             </a:fld>
             <a:endParaRPr lang="zh-CN" altLang="en-US"/>
           </a:p>
@@ -1815,7 +1816,7 @@
           <a:p>
             <a:fld id="{C4DC939B-3778-4627-B2FC-DFBA9DECBC45}" type="datetimeFigureOut">
               <a:rPr lang="zh-CN" altLang="en-US" smtClean="0"/>
-              <a:t>2023/11/17</a:t>
+              <a:t>2023/11/22</a:t>
             </a:fld>
             <a:endParaRPr lang="zh-CN" altLang="en-US"/>
           </a:p>
@@ -1956,7 +1957,7 @@
           <a:p>
             <a:fld id="{C4DC939B-3778-4627-B2FC-DFBA9DECBC45}" type="datetimeFigureOut">
               <a:rPr lang="zh-CN" altLang="en-US" smtClean="0"/>
-              <a:t>2023/11/17</a:t>
+              <a:t>2023/11/22</a:t>
             </a:fld>
             <a:endParaRPr lang="zh-CN" altLang="en-US"/>
           </a:p>
@@ -2069,7 +2070,7 @@
           <a:p>
             <a:fld id="{C4DC939B-3778-4627-B2FC-DFBA9DECBC45}" type="datetimeFigureOut">
               <a:rPr lang="zh-CN" altLang="en-US" smtClean="0"/>
-              <a:t>2023/11/17</a:t>
+              <a:t>2023/11/22</a:t>
             </a:fld>
             <a:endParaRPr lang="zh-CN" altLang="en-US"/>
           </a:p>
@@ -2380,7 +2381,7 @@
           <a:p>
             <a:fld id="{C4DC939B-3778-4627-B2FC-DFBA9DECBC45}" type="datetimeFigureOut">
               <a:rPr lang="zh-CN" altLang="en-US" smtClean="0"/>
-              <a:t>2023/11/17</a:t>
+              <a:t>2023/11/22</a:t>
             </a:fld>
             <a:endParaRPr lang="zh-CN" altLang="en-US"/>
           </a:p>
@@ -2668,7 +2669,7 @@
           <a:p>
             <a:fld id="{C4DC939B-3778-4627-B2FC-DFBA9DECBC45}" type="datetimeFigureOut">
               <a:rPr lang="zh-CN" altLang="en-US" smtClean="0"/>
-              <a:t>2023/11/17</a:t>
+              <a:t>2023/11/22</a:t>
             </a:fld>
             <a:endParaRPr lang="zh-CN" altLang="en-US"/>
           </a:p>
@@ -2909,7 +2910,7 @@
           <a:p>
             <a:fld id="{C4DC939B-3778-4627-B2FC-DFBA9DECBC45}" type="datetimeFigureOut">
               <a:rPr lang="zh-CN" altLang="en-US" smtClean="0"/>
-              <a:t>2023/11/17</a:t>
+              <a:t>2023/11/22</a:t>
             </a:fld>
             <a:endParaRPr lang="zh-CN" altLang="en-US"/>
           </a:p>
@@ -4749,6 +4750,825 @@
 </p:sld>
 </file>
 
+<file path=ppt/slides/slide2.xml><?xml version="1.0" encoding="utf-8"?>
+<p:sld xmlns:a="http://schemas.openxmlformats.org/drawingml/2006/main" xmlns:r="http://schemas.openxmlformats.org/officeDocument/2006/relationships" xmlns:p="http://schemas.openxmlformats.org/presentationml/2006/main">
+  <p:cSld>
+    <p:spTree>
+      <p:nvGrpSpPr>
+        <p:cNvPr id="1" name=""/>
+        <p:cNvGrpSpPr/>
+        <p:nvPr/>
+      </p:nvGrpSpPr>
+      <p:grpSpPr>
+        <a:xfrm>
+          <a:off x="0" y="0"/>
+          <a:ext cx="0" cy="0"/>
+          <a:chOff x="0" y="0"/>
+          <a:chExt cx="0" cy="0"/>
+        </a:xfrm>
+      </p:grpSpPr>
+      <p:pic>
+        <p:nvPicPr>
+          <p:cNvPr id="6" name="图片 5">
+            <a:extLst>
+              <a:ext uri="{FF2B5EF4-FFF2-40B4-BE49-F238E27FC236}">
+                <a16:creationId xmlns:a16="http://schemas.microsoft.com/office/drawing/2014/main" id="{F01A5011-715E-1A7E-A09A-3C4E7F4CAEED}"/>
+              </a:ext>
+            </a:extLst>
+          </p:cNvPr>
+          <p:cNvPicPr>
+            <a:picLocks noChangeAspect="1"/>
+          </p:cNvPicPr>
+          <p:nvPr/>
+        </p:nvPicPr>
+        <p:blipFill>
+          <a:blip r:embed="rId2"/>
+          <a:stretch>
+            <a:fillRect/>
+          </a:stretch>
+        </p:blipFill>
+        <p:spPr>
+          <a:xfrm flipV="1">
+            <a:off x="1438118" y="217012"/>
+            <a:ext cx="1324704" cy="1285453"/>
+          </a:xfrm>
+          <a:prstGeom prst="rect">
+            <a:avLst/>
+          </a:prstGeom>
+        </p:spPr>
+      </p:pic>
+      <p:pic>
+        <p:nvPicPr>
+          <p:cNvPr id="7" name="图片 6">
+            <a:extLst>
+              <a:ext uri="{FF2B5EF4-FFF2-40B4-BE49-F238E27FC236}">
+                <a16:creationId xmlns:a16="http://schemas.microsoft.com/office/drawing/2014/main" id="{F2545300-90F3-DF9F-8FCA-240288DA243D}"/>
+              </a:ext>
+            </a:extLst>
+          </p:cNvPr>
+          <p:cNvPicPr>
+            <a:picLocks noChangeAspect="1"/>
+          </p:cNvPicPr>
+          <p:nvPr/>
+        </p:nvPicPr>
+        <p:blipFill>
+          <a:blip r:embed="rId2"/>
+          <a:stretch>
+            <a:fillRect/>
+          </a:stretch>
+        </p:blipFill>
+        <p:spPr>
+          <a:xfrm flipV="1">
+            <a:off x="1438118" y="2173448"/>
+            <a:ext cx="1324704" cy="1285453"/>
+          </a:xfrm>
+          <a:prstGeom prst="rect">
+            <a:avLst/>
+          </a:prstGeom>
+        </p:spPr>
+      </p:pic>
+      <p:pic>
+        <p:nvPicPr>
+          <p:cNvPr id="10" name="图片 9">
+            <a:extLst>
+              <a:ext uri="{FF2B5EF4-FFF2-40B4-BE49-F238E27FC236}">
+                <a16:creationId xmlns:a16="http://schemas.microsoft.com/office/drawing/2014/main" id="{0CF23231-CB19-2421-CDE4-25A5B5966C05}"/>
+              </a:ext>
+            </a:extLst>
+          </p:cNvPr>
+          <p:cNvPicPr>
+            <a:picLocks noChangeAspect="1"/>
+          </p:cNvPicPr>
+          <p:nvPr/>
+        </p:nvPicPr>
+        <p:blipFill>
+          <a:blip r:embed="rId3"/>
+          <a:stretch>
+            <a:fillRect/>
+          </a:stretch>
+        </p:blipFill>
+        <p:spPr>
+          <a:xfrm>
+            <a:off x="5188688" y="1254037"/>
+            <a:ext cx="1324704" cy="1319648"/>
+          </a:xfrm>
+          <a:prstGeom prst="rect">
+            <a:avLst/>
+          </a:prstGeom>
+        </p:spPr>
+      </p:pic>
+      <p:pic>
+        <p:nvPicPr>
+          <p:cNvPr id="12" name="图片 11">
+            <a:extLst>
+              <a:ext uri="{FF2B5EF4-FFF2-40B4-BE49-F238E27FC236}">
+                <a16:creationId xmlns:a16="http://schemas.microsoft.com/office/drawing/2014/main" id="{09AB8256-7A83-8919-61D2-B23650C13E78}"/>
+              </a:ext>
+            </a:extLst>
+          </p:cNvPr>
+          <p:cNvPicPr>
+            <a:picLocks noChangeAspect="1"/>
+          </p:cNvPicPr>
+          <p:nvPr/>
+        </p:nvPicPr>
+        <p:blipFill>
+          <a:blip r:embed="rId4"/>
+          <a:stretch>
+            <a:fillRect/>
+          </a:stretch>
+        </p:blipFill>
+        <p:spPr>
+          <a:xfrm>
+            <a:off x="5204432" y="3214214"/>
+            <a:ext cx="1324704" cy="1300764"/>
+          </a:xfrm>
+          <a:prstGeom prst="rect">
+            <a:avLst/>
+          </a:prstGeom>
+        </p:spPr>
+      </p:pic>
+      <p:pic>
+        <p:nvPicPr>
+          <p:cNvPr id="16" name="图片 15">
+            <a:extLst>
+              <a:ext uri="{FF2B5EF4-FFF2-40B4-BE49-F238E27FC236}">
+                <a16:creationId xmlns:a16="http://schemas.microsoft.com/office/drawing/2014/main" id="{A990F5C8-CC34-CDDF-0DAC-3A8BD80837AE}"/>
+              </a:ext>
+            </a:extLst>
+          </p:cNvPr>
+          <p:cNvPicPr>
+            <a:picLocks noChangeAspect="1"/>
+          </p:cNvPicPr>
+          <p:nvPr/>
+        </p:nvPicPr>
+        <p:blipFill>
+          <a:blip r:embed="rId5"/>
+          <a:stretch>
+            <a:fillRect/>
+          </a:stretch>
+        </p:blipFill>
+        <p:spPr>
+          <a:xfrm>
+            <a:off x="9467861" y="2119986"/>
+            <a:ext cx="1324704" cy="1309014"/>
+          </a:xfrm>
+          <a:prstGeom prst="rect">
+            <a:avLst/>
+          </a:prstGeom>
+        </p:spPr>
+      </p:pic>
+      <p:pic>
+        <p:nvPicPr>
+          <p:cNvPr id="19" name="图片 18">
+            <a:extLst>
+              <a:ext uri="{FF2B5EF4-FFF2-40B4-BE49-F238E27FC236}">
+                <a16:creationId xmlns:a16="http://schemas.microsoft.com/office/drawing/2014/main" id="{FB0F2888-5B90-721C-1E32-ACC36644A4E2}"/>
+              </a:ext>
+            </a:extLst>
+          </p:cNvPr>
+          <p:cNvPicPr>
+            <a:picLocks noChangeAspect="1"/>
+          </p:cNvPicPr>
+          <p:nvPr/>
+        </p:nvPicPr>
+        <p:blipFill rotWithShape="1">
+          <a:blip r:embed="rId6"/>
+          <a:srcRect t="10267"/>
+          <a:stretch/>
+        </p:blipFill>
+        <p:spPr>
+          <a:xfrm>
+            <a:off x="6817343" y="2119986"/>
+            <a:ext cx="2346567" cy="1801564"/>
+          </a:xfrm>
+          <a:prstGeom prst="rect">
+            <a:avLst/>
+          </a:prstGeom>
+        </p:spPr>
+      </p:pic>
+      <p:sp>
+        <p:nvSpPr>
+          <p:cNvPr id="20" name="文本框 19">
+            <a:extLst>
+              <a:ext uri="{FF2B5EF4-FFF2-40B4-BE49-F238E27FC236}">
+                <a16:creationId xmlns:a16="http://schemas.microsoft.com/office/drawing/2014/main" id="{11F103CA-FBAB-E84A-9328-6A45728ED76D}"/>
+              </a:ext>
+            </a:extLst>
+          </p:cNvPr>
+          <p:cNvSpPr txBox="1"/>
+          <p:nvPr/>
+        </p:nvSpPr>
+        <p:spPr>
+          <a:xfrm>
+            <a:off x="7122438" y="4049262"/>
+            <a:ext cx="1736373" cy="369332"/>
+          </a:xfrm>
+          <a:prstGeom prst="rect">
+            <a:avLst/>
+          </a:prstGeom>
+          <a:noFill/>
+        </p:spPr>
+        <p:txBody>
+          <a:bodyPr wrap="none" rtlCol="0">
+            <a:spAutoFit/>
+          </a:bodyPr>
+          <a:lstStyle/>
+          <a:p>
+            <a:r>
+              <a:rPr lang="en-US" altLang="zh-CN" dirty="0">
+                <a:latin typeface="Times New Roman" panose="02020603050405020304" pitchFamily="18" charset="0"/>
+                <a:cs typeface="Times New Roman" panose="02020603050405020304" pitchFamily="18" charset="0"/>
+              </a:rPr>
+              <a:t>no share weights</a:t>
+            </a:r>
+            <a:endParaRPr lang="zh-CN" altLang="en-US" dirty="0">
+              <a:latin typeface="Times New Roman" panose="02020603050405020304" pitchFamily="18" charset="0"/>
+              <a:cs typeface="Times New Roman" panose="02020603050405020304" pitchFamily="18" charset="0"/>
+            </a:endParaRPr>
+          </a:p>
+        </p:txBody>
+      </p:sp>
+      <p:sp>
+        <p:nvSpPr>
+          <p:cNvPr id="25" name="矩形 24">
+            <a:extLst>
+              <a:ext uri="{FF2B5EF4-FFF2-40B4-BE49-F238E27FC236}">
+                <a16:creationId xmlns:a16="http://schemas.microsoft.com/office/drawing/2014/main" id="{790A3290-DC62-2A88-7953-AFB8E5585462}"/>
+              </a:ext>
+            </a:extLst>
+          </p:cNvPr>
+          <p:cNvSpPr/>
+          <p:nvPr/>
+        </p:nvSpPr>
+        <p:spPr>
+          <a:xfrm>
+            <a:off x="5204432" y="4529522"/>
+            <a:ext cx="1324704" cy="341559"/>
+          </a:xfrm>
+          <a:prstGeom prst="rect">
+            <a:avLst/>
+          </a:prstGeom>
+        </p:spPr>
+        <p:style>
+          <a:lnRef idx="2">
+            <a:schemeClr val="accent1">
+              <a:shade val="15000"/>
+            </a:schemeClr>
+          </a:lnRef>
+          <a:fillRef idx="1">
+            <a:schemeClr val="accent1"/>
+          </a:fillRef>
+          <a:effectRef idx="0">
+            <a:schemeClr val="accent1"/>
+          </a:effectRef>
+          <a:fontRef idx="minor">
+            <a:schemeClr val="lt1"/>
+          </a:fontRef>
+        </p:style>
+        <p:txBody>
+          <a:bodyPr rtlCol="0" anchor="ctr"/>
+          <a:lstStyle/>
+          <a:p>
+            <a:pPr algn="ctr"/>
+            <a:r>
+              <a:rPr lang="en-US" altLang="zh-CN" dirty="0" err="1">
+                <a:latin typeface="Times New Roman" panose="02020603050405020304" pitchFamily="18" charset="0"/>
+                <a:cs typeface="Times New Roman" panose="02020603050405020304" pitchFamily="18" charset="0"/>
+              </a:rPr>
+              <a:t>pre_vhr</a:t>
+            </a:r>
+            <a:endParaRPr lang="zh-CN" altLang="en-US" dirty="0">
+              <a:latin typeface="Times New Roman" panose="02020603050405020304" pitchFamily="18" charset="0"/>
+              <a:cs typeface="Times New Roman" panose="02020603050405020304" pitchFamily="18" charset="0"/>
+            </a:endParaRPr>
+          </a:p>
+        </p:txBody>
+      </p:sp>
+      <p:sp>
+        <p:nvSpPr>
+          <p:cNvPr id="28" name="矩形 27">
+            <a:extLst>
+              <a:ext uri="{FF2B5EF4-FFF2-40B4-BE49-F238E27FC236}">
+                <a16:creationId xmlns:a16="http://schemas.microsoft.com/office/drawing/2014/main" id="{9CC66C30-0766-EAE3-7948-1F2CCF0576C9}"/>
+              </a:ext>
+            </a:extLst>
+          </p:cNvPr>
+          <p:cNvSpPr/>
+          <p:nvPr/>
+        </p:nvSpPr>
+        <p:spPr>
+          <a:xfrm>
+            <a:off x="1484941" y="1474782"/>
+            <a:ext cx="1231059" cy="285991"/>
+          </a:xfrm>
+          <a:prstGeom prst="rect">
+            <a:avLst/>
+          </a:prstGeom>
+        </p:spPr>
+        <p:style>
+          <a:lnRef idx="2">
+            <a:schemeClr val="accent1">
+              <a:shade val="15000"/>
+            </a:schemeClr>
+          </a:lnRef>
+          <a:fillRef idx="1">
+            <a:schemeClr val="accent1"/>
+          </a:fillRef>
+          <a:effectRef idx="0">
+            <a:schemeClr val="accent1"/>
+          </a:effectRef>
+          <a:fontRef idx="minor">
+            <a:schemeClr val="lt1"/>
+          </a:fontRef>
+        </p:style>
+        <p:txBody>
+          <a:bodyPr rtlCol="0" anchor="ctr"/>
+          <a:lstStyle/>
+          <a:p>
+            <a:pPr algn="ctr"/>
+            <a:r>
+              <a:rPr lang="en-US" altLang="zh-CN" dirty="0" err="1">
+                <a:latin typeface="Times New Roman" panose="02020603050405020304" pitchFamily="18" charset="0"/>
+                <a:cs typeface="Times New Roman" panose="02020603050405020304" pitchFamily="18" charset="0"/>
+              </a:rPr>
+              <a:t>pre_modis</a:t>
+            </a:r>
+            <a:r>
+              <a:rPr lang="en-US" altLang="zh-CN" dirty="0">
+                <a:latin typeface="Times New Roman" panose="02020603050405020304" pitchFamily="18" charset="0"/>
+                <a:cs typeface="Times New Roman" panose="02020603050405020304" pitchFamily="18" charset="0"/>
+              </a:rPr>
+              <a:t> </a:t>
+            </a:r>
+            <a:endParaRPr lang="zh-CN" altLang="en-US" dirty="0">
+              <a:latin typeface="Times New Roman" panose="02020603050405020304" pitchFamily="18" charset="0"/>
+              <a:cs typeface="Times New Roman" panose="02020603050405020304" pitchFamily="18" charset="0"/>
+            </a:endParaRPr>
+          </a:p>
+        </p:txBody>
+      </p:sp>
+      <p:sp>
+        <p:nvSpPr>
+          <p:cNvPr id="2" name="文本框 1">
+            <a:extLst>
+              <a:ext uri="{FF2B5EF4-FFF2-40B4-BE49-F238E27FC236}">
+                <a16:creationId xmlns:a16="http://schemas.microsoft.com/office/drawing/2014/main" id="{2918551D-E199-79FF-DFB6-FD5DD2222D83}"/>
+              </a:ext>
+            </a:extLst>
+          </p:cNvPr>
+          <p:cNvSpPr txBox="1"/>
+          <p:nvPr/>
+        </p:nvSpPr>
+        <p:spPr>
+          <a:xfrm>
+            <a:off x="4101737" y="139337"/>
+            <a:ext cx="3788229" cy="830997"/>
+          </a:xfrm>
+          <a:prstGeom prst="rect">
+            <a:avLst/>
+          </a:prstGeom>
+          <a:noFill/>
+        </p:spPr>
+        <p:txBody>
+          <a:bodyPr wrap="square" rtlCol="0">
+            <a:spAutoFit/>
+          </a:bodyPr>
+          <a:lstStyle/>
+          <a:p>
+            <a:pPr algn="ctr"/>
+            <a:r>
+              <a:rPr lang="en-US" altLang="zh-CN" sz="2400" b="1" dirty="0">
+                <a:latin typeface="Times New Roman" panose="02020603050405020304" pitchFamily="18" charset="0"/>
+                <a:cs typeface="Times New Roman" panose="02020603050405020304" pitchFamily="18" charset="0"/>
+              </a:rPr>
+              <a:t>Framework v1.1 for Spacenet8 test</a:t>
+            </a:r>
+          </a:p>
+        </p:txBody>
+      </p:sp>
+      <p:sp>
+        <p:nvSpPr>
+          <p:cNvPr id="3" name="矩形 2">
+            <a:extLst>
+              <a:ext uri="{FF2B5EF4-FFF2-40B4-BE49-F238E27FC236}">
+                <a16:creationId xmlns:a16="http://schemas.microsoft.com/office/drawing/2014/main" id="{0E8C7908-B1B1-87E6-5EA3-9EABF145451E}"/>
+              </a:ext>
+            </a:extLst>
+          </p:cNvPr>
+          <p:cNvSpPr/>
+          <p:nvPr/>
+        </p:nvSpPr>
+        <p:spPr>
+          <a:xfrm>
+            <a:off x="1438118" y="3458901"/>
+            <a:ext cx="1324704" cy="285991"/>
+          </a:xfrm>
+          <a:prstGeom prst="rect">
+            <a:avLst/>
+          </a:prstGeom>
+        </p:spPr>
+        <p:style>
+          <a:lnRef idx="2">
+            <a:schemeClr val="accent1">
+              <a:shade val="15000"/>
+            </a:schemeClr>
+          </a:lnRef>
+          <a:fillRef idx="1">
+            <a:schemeClr val="accent1"/>
+          </a:fillRef>
+          <a:effectRef idx="0">
+            <a:schemeClr val="accent1"/>
+          </a:effectRef>
+          <a:fontRef idx="minor">
+            <a:schemeClr val="lt1"/>
+          </a:fontRef>
+        </p:style>
+        <p:txBody>
+          <a:bodyPr rtlCol="0" anchor="ctr"/>
+          <a:lstStyle/>
+          <a:p>
+            <a:pPr algn="ctr"/>
+            <a:r>
+              <a:rPr lang="en-US" altLang="zh-CN" dirty="0" err="1">
+                <a:latin typeface="Times New Roman" panose="02020603050405020304" pitchFamily="18" charset="0"/>
+                <a:cs typeface="Times New Roman" panose="02020603050405020304" pitchFamily="18" charset="0"/>
+              </a:rPr>
+              <a:t>post_modis</a:t>
+            </a:r>
+            <a:endParaRPr lang="zh-CN" altLang="en-US" dirty="0">
+              <a:latin typeface="Times New Roman" panose="02020603050405020304" pitchFamily="18" charset="0"/>
+              <a:cs typeface="Times New Roman" panose="02020603050405020304" pitchFamily="18" charset="0"/>
+            </a:endParaRPr>
+          </a:p>
+        </p:txBody>
+      </p:sp>
+      <p:sp>
+        <p:nvSpPr>
+          <p:cNvPr id="13" name="文本框 12">
+            <a:extLst>
+              <a:ext uri="{FF2B5EF4-FFF2-40B4-BE49-F238E27FC236}">
+                <a16:creationId xmlns:a16="http://schemas.microsoft.com/office/drawing/2014/main" id="{35411500-7C50-9088-F29A-34D10D5266AA}"/>
+              </a:ext>
+            </a:extLst>
+          </p:cNvPr>
+          <p:cNvSpPr txBox="1"/>
+          <p:nvPr/>
+        </p:nvSpPr>
+        <p:spPr>
+          <a:xfrm>
+            <a:off x="479054" y="4258906"/>
+            <a:ext cx="3161211" cy="1446550"/>
+          </a:xfrm>
+          <a:prstGeom prst="rect">
+            <a:avLst/>
+          </a:prstGeom>
+          <a:noFill/>
+        </p:spPr>
+        <p:txBody>
+          <a:bodyPr wrap="square" rtlCol="0">
+            <a:spAutoFit/>
+          </a:bodyPr>
+          <a:lstStyle/>
+          <a:p>
+            <a:r>
+              <a:rPr lang="en-US" altLang="zh-CN" b="1" dirty="0">
+                <a:latin typeface="Times New Roman" panose="02020603050405020304" pitchFamily="18" charset="0"/>
+                <a:cs typeface="Times New Roman" panose="02020603050405020304" pitchFamily="18" charset="0"/>
+              </a:rPr>
+              <a:t>Details of </a:t>
+            </a:r>
+            <a:r>
+              <a:rPr lang="en-US" altLang="zh-CN" b="1" dirty="0" err="1">
+                <a:latin typeface="Times New Roman" panose="02020603050405020304" pitchFamily="18" charset="0"/>
+                <a:cs typeface="Times New Roman" panose="02020603050405020304" pitchFamily="18" charset="0"/>
+              </a:rPr>
+              <a:t>modis</a:t>
+            </a:r>
+            <a:r>
+              <a:rPr lang="en-US" altLang="zh-CN" b="1" dirty="0">
+                <a:latin typeface="Times New Roman" panose="02020603050405020304" pitchFamily="18" charset="0"/>
+                <a:cs typeface="Times New Roman" panose="02020603050405020304" pitchFamily="18" charset="0"/>
+              </a:rPr>
+              <a:t> data:</a:t>
+            </a:r>
+          </a:p>
+          <a:p>
+            <a:pPr marL="285750" indent="-285750">
+              <a:buFont typeface="Arial" panose="020B0604020202020204" pitchFamily="34" charset="0"/>
+              <a:buChar char="•"/>
+            </a:pPr>
+            <a:r>
+              <a:rPr lang="en-US" altLang="zh-CN" sz="1400" dirty="0">
+                <a:latin typeface="Times New Roman" panose="02020603050405020304" pitchFamily="18" charset="0"/>
+                <a:cs typeface="Times New Roman" panose="02020603050405020304" pitchFamily="18" charset="0"/>
+              </a:rPr>
+              <a:t>Channels: 2. (According to </a:t>
+            </a:r>
+            <a:r>
+              <a:rPr lang="en-US" altLang="zh-CN" sz="1400" dirty="0" err="1">
+                <a:latin typeface="Times New Roman" panose="02020603050405020304" pitchFamily="18" charset="0"/>
+                <a:cs typeface="Times New Roman" panose="02020603050405020304" pitchFamily="18" charset="0"/>
+              </a:rPr>
+              <a:t>Tellman</a:t>
+            </a:r>
+            <a:r>
+              <a:rPr lang="en-US" altLang="zh-CN" sz="1400" dirty="0">
+                <a:latin typeface="Times New Roman" panose="02020603050405020304" pitchFamily="18" charset="0"/>
+                <a:cs typeface="Times New Roman" panose="02020603050405020304" pitchFamily="18" charset="0"/>
+              </a:rPr>
+              <a:t> et al. 2021, two bands were used to generate flood map: band 7 and the ratio of band 1 to band 2. Here we only consider the images of Terra.)</a:t>
+            </a:r>
+          </a:p>
+        </p:txBody>
+      </p:sp>
+      <p:sp>
+        <p:nvSpPr>
+          <p:cNvPr id="15" name="箭头: 右 14">
+            <a:extLst>
+              <a:ext uri="{FF2B5EF4-FFF2-40B4-BE49-F238E27FC236}">
+                <a16:creationId xmlns:a16="http://schemas.microsoft.com/office/drawing/2014/main" id="{5071A45E-995A-046C-3C87-928CE0D91511}"/>
+              </a:ext>
+            </a:extLst>
+          </p:cNvPr>
+          <p:cNvSpPr/>
+          <p:nvPr/>
+        </p:nvSpPr>
+        <p:spPr>
+          <a:xfrm>
+            <a:off x="2762822" y="1681898"/>
+            <a:ext cx="1854925" cy="438088"/>
+          </a:xfrm>
+          <a:prstGeom prst="rightArrow">
+            <a:avLst/>
+          </a:prstGeom>
+        </p:spPr>
+        <p:style>
+          <a:lnRef idx="2">
+            <a:schemeClr val="accent1">
+              <a:shade val="15000"/>
+            </a:schemeClr>
+          </a:lnRef>
+          <a:fillRef idx="1">
+            <a:schemeClr val="accent1"/>
+          </a:fillRef>
+          <a:effectRef idx="0">
+            <a:schemeClr val="accent1"/>
+          </a:effectRef>
+          <a:fontRef idx="minor">
+            <a:schemeClr val="lt1"/>
+          </a:fontRef>
+        </p:style>
+        <p:txBody>
+          <a:bodyPr rtlCol="0" anchor="ctr"/>
+          <a:lstStyle/>
+          <a:p>
+            <a:pPr algn="ctr"/>
+            <a:r>
+              <a:rPr lang="en-US" altLang="zh-CN" sz="1400" dirty="0">
+                <a:latin typeface="Times New Roman" panose="02020603050405020304" pitchFamily="18" charset="0"/>
+                <a:cs typeface="Times New Roman" panose="02020603050405020304" pitchFamily="18" charset="0"/>
+              </a:rPr>
+              <a:t>D</a:t>
+            </a:r>
+            <a:r>
+              <a:rPr lang="de-DE" altLang="zh-CN" sz="1400" dirty="0">
+                <a:latin typeface="Times New Roman" panose="02020603050405020304" pitchFamily="18" charset="0"/>
+                <a:cs typeface="Times New Roman" panose="02020603050405020304" pitchFamily="18" charset="0"/>
+              </a:rPr>
+              <a:t>irect Concatenation</a:t>
+            </a:r>
+            <a:endParaRPr lang="zh-CN" altLang="en-US" sz="2000" dirty="0"/>
+          </a:p>
+        </p:txBody>
+      </p:sp>
+      <p:sp>
+        <p:nvSpPr>
+          <p:cNvPr id="33" name="文本框 32">
+            <a:extLst>
+              <a:ext uri="{FF2B5EF4-FFF2-40B4-BE49-F238E27FC236}">
+                <a16:creationId xmlns:a16="http://schemas.microsoft.com/office/drawing/2014/main" id="{4D72D287-0E7D-C6E4-8A84-83E3788616E4}"/>
+              </a:ext>
+            </a:extLst>
+          </p:cNvPr>
+          <p:cNvSpPr txBox="1"/>
+          <p:nvPr/>
+        </p:nvSpPr>
+        <p:spPr>
+          <a:xfrm>
+            <a:off x="6924397" y="3864596"/>
+            <a:ext cx="2132457" cy="369332"/>
+          </a:xfrm>
+          <a:prstGeom prst="rect">
+            <a:avLst/>
+          </a:prstGeom>
+          <a:noFill/>
+        </p:spPr>
+        <p:txBody>
+          <a:bodyPr wrap="square">
+            <a:spAutoFit/>
+          </a:bodyPr>
+          <a:lstStyle/>
+          <a:p>
+            <a:pPr algn="ctr"/>
+            <a:r>
+              <a:rPr lang="en-US" altLang="zh-CN" sz="1800" dirty="0">
+                <a:latin typeface="Times New Roman" panose="02020603050405020304" pitchFamily="18" charset="0"/>
+                <a:cs typeface="Times New Roman" panose="02020603050405020304" pitchFamily="18" charset="0"/>
+              </a:rPr>
+              <a:t>Siamese CNN</a:t>
+            </a:r>
+            <a:endParaRPr lang="zh-CN" altLang="en-US" sz="1800" dirty="0">
+              <a:latin typeface="Times New Roman" panose="02020603050405020304" pitchFamily="18" charset="0"/>
+              <a:cs typeface="Times New Roman" panose="02020603050405020304" pitchFamily="18" charset="0"/>
+            </a:endParaRPr>
+          </a:p>
+        </p:txBody>
+      </p:sp>
+      <p:sp>
+        <p:nvSpPr>
+          <p:cNvPr id="44" name="文本框 43">
+            <a:extLst>
+              <a:ext uri="{FF2B5EF4-FFF2-40B4-BE49-F238E27FC236}">
+                <a16:creationId xmlns:a16="http://schemas.microsoft.com/office/drawing/2014/main" id="{38B43C5E-9F4E-EEDE-4310-C625CA91541E}"/>
+              </a:ext>
+            </a:extLst>
+          </p:cNvPr>
+          <p:cNvSpPr txBox="1"/>
+          <p:nvPr/>
+        </p:nvSpPr>
+        <p:spPr>
+          <a:xfrm>
+            <a:off x="8790832" y="121215"/>
+            <a:ext cx="3161211" cy="584775"/>
+          </a:xfrm>
+          <a:prstGeom prst="rect">
+            <a:avLst/>
+          </a:prstGeom>
+          <a:noFill/>
+        </p:spPr>
+        <p:txBody>
+          <a:bodyPr wrap="square" rtlCol="0">
+            <a:spAutoFit/>
+          </a:bodyPr>
+          <a:lstStyle/>
+          <a:p>
+            <a:r>
+              <a:rPr lang="en-US" altLang="zh-CN" b="1" dirty="0">
+                <a:latin typeface="Times New Roman" panose="02020603050405020304" pitchFamily="18" charset="0"/>
+                <a:cs typeface="Times New Roman" panose="02020603050405020304" pitchFamily="18" charset="0"/>
+              </a:rPr>
+              <a:t>Details of VHR data:</a:t>
+            </a:r>
+          </a:p>
+          <a:p>
+            <a:pPr marL="285750" indent="-285750">
+              <a:buFont typeface="Arial" panose="020B0604020202020204" pitchFamily="34" charset="0"/>
+              <a:buChar char="•"/>
+            </a:pPr>
+            <a:r>
+              <a:rPr lang="en-US" altLang="zh-CN" sz="1400" dirty="0">
+                <a:latin typeface="Times New Roman" panose="02020603050405020304" pitchFamily="18" charset="0"/>
+                <a:cs typeface="Times New Roman" panose="02020603050405020304" pitchFamily="18" charset="0"/>
+              </a:rPr>
+              <a:t>Channels: 3. (RGB)</a:t>
+            </a:r>
+          </a:p>
+        </p:txBody>
+      </p:sp>
+      <p:sp>
+        <p:nvSpPr>
+          <p:cNvPr id="45" name="文本框 44">
+            <a:extLst>
+              <a:ext uri="{FF2B5EF4-FFF2-40B4-BE49-F238E27FC236}">
+                <a16:creationId xmlns:a16="http://schemas.microsoft.com/office/drawing/2014/main" id="{F460E366-C99F-9442-3D72-6D7672CC6D76}"/>
+              </a:ext>
+            </a:extLst>
+          </p:cNvPr>
+          <p:cNvSpPr txBox="1"/>
+          <p:nvPr/>
+        </p:nvSpPr>
+        <p:spPr>
+          <a:xfrm>
+            <a:off x="4290938" y="2145530"/>
+            <a:ext cx="1057611" cy="307777"/>
+          </a:xfrm>
+          <a:prstGeom prst="rect">
+            <a:avLst/>
+          </a:prstGeom>
+          <a:noFill/>
+        </p:spPr>
+        <p:txBody>
+          <a:bodyPr wrap="square">
+            <a:spAutoFit/>
+          </a:bodyPr>
+          <a:lstStyle/>
+          <a:p>
+            <a:r>
+              <a:rPr lang="en-US" altLang="zh-CN" sz="1400" dirty="0" err="1">
+                <a:solidFill>
+                  <a:prstClr val="black"/>
+                </a:solidFill>
+                <a:latin typeface="Times New Roman" panose="02020603050405020304" pitchFamily="18" charset="0"/>
+                <a:ea typeface="等线" panose="02010600030101010101" pitchFamily="2" charset="-122"/>
+                <a:cs typeface="Times New Roman" panose="02020603050405020304" pitchFamily="18" charset="0"/>
+              </a:rPr>
+              <a:t>Upsample</a:t>
+            </a:r>
+            <a:endParaRPr lang="zh-CN" altLang="en-US" sz="1400" dirty="0"/>
+          </a:p>
+        </p:txBody>
+      </p:sp>
+      <p:sp>
+        <p:nvSpPr>
+          <p:cNvPr id="4" name="文本框 3">
+            <a:extLst>
+              <a:ext uri="{FF2B5EF4-FFF2-40B4-BE49-F238E27FC236}">
+                <a16:creationId xmlns:a16="http://schemas.microsoft.com/office/drawing/2014/main" id="{79FDCA56-0173-23E4-93AD-54FDE0052F26}"/>
+              </a:ext>
+            </a:extLst>
+          </p:cNvPr>
+          <p:cNvSpPr txBox="1"/>
+          <p:nvPr/>
+        </p:nvSpPr>
+        <p:spPr>
+          <a:xfrm>
+            <a:off x="7990624" y="5066066"/>
+            <a:ext cx="3161211" cy="1015663"/>
+          </a:xfrm>
+          <a:prstGeom prst="rect">
+            <a:avLst/>
+          </a:prstGeom>
+          <a:noFill/>
+        </p:spPr>
+        <p:txBody>
+          <a:bodyPr wrap="square" rtlCol="0">
+            <a:spAutoFit/>
+          </a:bodyPr>
+          <a:lstStyle/>
+          <a:p>
+            <a:r>
+              <a:rPr lang="en-US" altLang="zh-CN" b="1" dirty="0">
+                <a:latin typeface="Times New Roman" panose="02020603050405020304" pitchFamily="18" charset="0"/>
+                <a:cs typeface="Times New Roman" panose="02020603050405020304" pitchFamily="18" charset="0"/>
+              </a:rPr>
+              <a:t>Details of this test</a:t>
+            </a:r>
+          </a:p>
+          <a:p>
+            <a:pPr marL="285750" indent="-285750">
+              <a:buFont typeface="Arial" panose="020B0604020202020204" pitchFamily="34" charset="0"/>
+              <a:buChar char="•"/>
+            </a:pPr>
+            <a:r>
+              <a:rPr lang="en-US" altLang="zh-CN" sz="1400" dirty="0">
+                <a:latin typeface="Times New Roman" panose="02020603050405020304" pitchFamily="18" charset="0"/>
+                <a:cs typeface="Times New Roman" panose="02020603050405020304" pitchFamily="18" charset="0"/>
+              </a:rPr>
+              <a:t>Just keep the data from Spacenet8</a:t>
+            </a:r>
+          </a:p>
+          <a:p>
+            <a:pPr marL="285750" indent="-285750">
+              <a:buFont typeface="Arial" panose="020B0604020202020204" pitchFamily="34" charset="0"/>
+              <a:buChar char="•"/>
+            </a:pPr>
+            <a:r>
+              <a:rPr lang="en-US" altLang="zh-CN" sz="1400" dirty="0">
+                <a:latin typeface="Times New Roman" panose="02020603050405020304" pitchFamily="18" charset="0"/>
+                <a:cs typeface="Times New Roman" panose="02020603050405020304" pitchFamily="18" charset="0"/>
+              </a:rPr>
+              <a:t>What we do is to</a:t>
+            </a:r>
+            <a:r>
+              <a:rPr lang="zh-CN" altLang="en-US" sz="1400" dirty="0">
+                <a:latin typeface="Times New Roman" panose="02020603050405020304" pitchFamily="18" charset="0"/>
+                <a:cs typeface="Times New Roman" panose="02020603050405020304" pitchFamily="18" charset="0"/>
+              </a:rPr>
+              <a:t> </a:t>
+            </a:r>
+            <a:r>
+              <a:rPr lang="en-US" altLang="zh-CN" sz="1400" dirty="0">
+                <a:latin typeface="Times New Roman" panose="02020603050405020304" pitchFamily="18" charset="0"/>
+                <a:cs typeface="Times New Roman" panose="02020603050405020304" pitchFamily="18" charset="0"/>
+              </a:rPr>
+              <a:t>download MODIS and train a new Siamese CNN</a:t>
+            </a:r>
+          </a:p>
+        </p:txBody>
+      </p:sp>
+    </p:spTree>
+    <p:extLst>
+      <p:ext uri="{BB962C8B-B14F-4D97-AF65-F5344CB8AC3E}">
+        <p14:creationId xmlns:p14="http://schemas.microsoft.com/office/powerpoint/2010/main" val="2262685453"/>
+      </p:ext>
+    </p:extLst>
+  </p:cSld>
+  <p:clrMapOvr>
+    <a:masterClrMapping/>
+  </p:clrMapOvr>
+</p:sld>
+</file>
+
 <file path=ppt/theme/theme1.xml><?xml version="1.0" encoding="utf-8"?>
 <a:theme xmlns:a="http://schemas.openxmlformats.org/drawingml/2006/main" name="Office 主题​​">
   <a:themeElements>

</xml_diff>